<commit_message>
Added images to videos 8-13
</commit_message>
<xml_diff>
--- a/src/video-08-descriptive-statistics.pptx
+++ b/src/video-08-descriptive-statistics.pptx
@@ -3283,31 +3283,36 @@
           </a:p>
         </p:txBody>
       </p:sp>
-      <p:sp>
-        <p:nvSpPr>
-          <p:cNvPr id="3" name="Content Placeholder 2"/>
-          <p:cNvSpPr>
-            <a:spLocks noGrp="1"/>
-          </p:cNvSpPr>
-          <p:nvPr>
-            <p:ph idx="1"/>
-          </p:nvPr>
-        </p:nvSpPr>
-        <p:spPr/>
-        <p:txBody>
-          <a:bodyPr/>
-          <a:lstStyle/>
-          <a:p>
-            <a:pPr lvl="0" marL="0" indent="0">
-              <a:buNone/>
-            </a:pPr>
-            <a:r>
-              <a:rPr/>
-              <a:t>(assets/img/image1.png)</a:t>
-            </a:r>
-          </a:p>
-        </p:txBody>
-      </p:sp>
+      <p:pic>
+        <p:nvPicPr>
+          <p:cNvPr descr="../images/image-08-01.png" id="0" name="Picture 1"/>
+          <p:cNvPicPr>
+            <a:picLocks noGrp="1" noChangeAspect="1"/>
+          </p:cNvPicPr>
+          <p:nvPr/>
+        </p:nvPicPr>
+        <p:blipFill>
+          <a:blip r:embed="rId2"/>
+          <a:stretch>
+            <a:fillRect/>
+          </a:stretch>
+        </p:blipFill>
+        <p:spPr bwMode="auto">
+          <a:xfrm>
+            <a:off x="457200" y="1943100"/>
+            <a:ext cx="8229600" cy="3848100"/>
+          </a:xfrm>
+          <a:prstGeom prst="rect">
+            <a:avLst/>
+          </a:prstGeom>
+          <a:noFill/>
+          <a:ln w="9525">
+            <a:noFill/>
+            <a:headEnd/>
+            <a:tailEnd/>
+          </a:ln>
+        </p:spPr>
+      </p:pic>
     </p:spTree>
   </p:cSld>
 </p:sld>
@@ -3355,31 +3360,36 @@
           </a:p>
         </p:txBody>
       </p:sp>
-      <p:sp>
-        <p:nvSpPr>
-          <p:cNvPr id="3" name="Content Placeholder 2"/>
-          <p:cNvSpPr>
-            <a:spLocks noGrp="1"/>
-          </p:cNvSpPr>
-          <p:nvPr>
-            <p:ph idx="1"/>
-          </p:nvPr>
-        </p:nvSpPr>
-        <p:spPr/>
-        <p:txBody>
-          <a:bodyPr/>
-          <a:lstStyle/>
-          <a:p>
-            <a:pPr lvl="0" marL="0" indent="0">
-              <a:buNone/>
-            </a:pPr>
-            <a:r>
-              <a:rPr/>
-              <a:t>(assets/img/image2.png)</a:t>
-            </a:r>
-          </a:p>
-        </p:txBody>
-      </p:sp>
+      <p:pic>
+        <p:nvPicPr>
+          <p:cNvPr descr="../images/image-08-02.png" id="0" name="Picture 1"/>
+          <p:cNvPicPr>
+            <a:picLocks noGrp="1" noChangeAspect="1"/>
+          </p:cNvPicPr>
+          <p:nvPr/>
+        </p:nvPicPr>
+        <p:blipFill>
+          <a:blip r:embed="rId2"/>
+          <a:stretch>
+            <a:fillRect/>
+          </a:stretch>
+        </p:blipFill>
+        <p:spPr bwMode="auto">
+          <a:xfrm>
+            <a:off x="457200" y="2133600"/>
+            <a:ext cx="8229600" cy="3454400"/>
+          </a:xfrm>
+          <a:prstGeom prst="rect">
+            <a:avLst/>
+          </a:prstGeom>
+          <a:noFill/>
+          <a:ln w="9525">
+            <a:noFill/>
+            <a:headEnd/>
+            <a:tailEnd/>
+          </a:ln>
+        </p:spPr>
+      </p:pic>
     </p:spTree>
   </p:cSld>
 </p:sld>
@@ -3526,31 +3536,36 @@
           </a:p>
         </p:txBody>
       </p:sp>
-      <p:sp>
-        <p:nvSpPr>
-          <p:cNvPr id="3" name="Content Placeholder 2"/>
-          <p:cNvSpPr>
-            <a:spLocks noGrp="1"/>
-          </p:cNvSpPr>
-          <p:nvPr>
-            <p:ph idx="1"/>
-          </p:nvPr>
-        </p:nvSpPr>
-        <p:spPr/>
-        <p:txBody>
-          <a:bodyPr/>
-          <a:lstStyle/>
-          <a:p>
-            <a:pPr lvl="0" marL="0" indent="0">
-              <a:buNone/>
-            </a:pPr>
-            <a:r>
-              <a:rPr/>
-              <a:t>(assets/img/image3.png)</a:t>
-            </a:r>
-          </a:p>
-        </p:txBody>
-      </p:sp>
+      <p:pic>
+        <p:nvPicPr>
+          <p:cNvPr descr="../images/image-08-03.png" id="0" name="Picture 1"/>
+          <p:cNvPicPr>
+            <a:picLocks noGrp="1" noChangeAspect="1"/>
+          </p:cNvPicPr>
+          <p:nvPr/>
+        </p:nvPicPr>
+        <p:blipFill>
+          <a:blip r:embed="rId2"/>
+          <a:stretch>
+            <a:fillRect/>
+          </a:stretch>
+        </p:blipFill>
+        <p:spPr bwMode="auto">
+          <a:xfrm>
+            <a:off x="749300" y="1600200"/>
+            <a:ext cx="7645400" cy="4521200"/>
+          </a:xfrm>
+          <a:prstGeom prst="rect">
+            <a:avLst/>
+          </a:prstGeom>
+          <a:noFill/>
+          <a:ln w="9525">
+            <a:noFill/>
+            <a:headEnd/>
+            <a:tailEnd/>
+          </a:ln>
+        </p:spPr>
+      </p:pic>
     </p:spTree>
   </p:cSld>
 </p:sld>
@@ -3719,31 +3734,36 @@
           </a:p>
         </p:txBody>
       </p:sp>
-      <p:sp>
-        <p:nvSpPr>
-          <p:cNvPr id="3" name="Content Placeholder 2"/>
-          <p:cNvSpPr>
-            <a:spLocks noGrp="1"/>
-          </p:cNvSpPr>
-          <p:nvPr>
-            <p:ph idx="1"/>
-          </p:nvPr>
-        </p:nvSpPr>
-        <p:spPr/>
-        <p:txBody>
-          <a:bodyPr/>
-          <a:lstStyle/>
-          <a:p>
-            <a:pPr lvl="0" marL="0" indent="0">
-              <a:buNone/>
-            </a:pPr>
-            <a:r>
-              <a:rPr/>
-              <a:t>(assets/img/image4.png)</a:t>
-            </a:r>
-          </a:p>
-        </p:txBody>
-      </p:sp>
+      <p:pic>
+        <p:nvPicPr>
+          <p:cNvPr descr="../images/image-08-04.png" id="0" name="Picture 1"/>
+          <p:cNvPicPr>
+            <a:picLocks noGrp="1" noChangeAspect="1"/>
+          </p:cNvPicPr>
+          <p:nvPr/>
+        </p:nvPicPr>
+        <p:blipFill>
+          <a:blip r:embed="rId2"/>
+          <a:stretch>
+            <a:fillRect/>
+          </a:stretch>
+        </p:blipFill>
+        <p:spPr bwMode="auto">
+          <a:xfrm>
+            <a:off x="1676400" y="1600200"/>
+            <a:ext cx="5791200" cy="4521200"/>
+          </a:xfrm>
+          <a:prstGeom prst="rect">
+            <a:avLst/>
+          </a:prstGeom>
+          <a:noFill/>
+          <a:ln w="9525">
+            <a:noFill/>
+            <a:headEnd/>
+            <a:tailEnd/>
+          </a:ln>
+        </p:spPr>
+      </p:pic>
     </p:spTree>
   </p:cSld>
 </p:sld>
@@ -4117,31 +4137,36 @@
           </a:p>
         </p:txBody>
       </p:sp>
-      <p:sp>
-        <p:nvSpPr>
-          <p:cNvPr id="3" name="Content Placeholder 2"/>
-          <p:cNvSpPr>
-            <a:spLocks noGrp="1"/>
-          </p:cNvSpPr>
-          <p:nvPr>
-            <p:ph idx="1"/>
-          </p:nvPr>
-        </p:nvSpPr>
-        <p:spPr/>
-        <p:txBody>
-          <a:bodyPr/>
-          <a:lstStyle/>
-          <a:p>
-            <a:pPr lvl="0" marL="0" indent="0">
-              <a:buNone/>
-            </a:pPr>
-            <a:r>
-              <a:rPr/>
-              <a:t>(assets/img/image5.png)</a:t>
-            </a:r>
-          </a:p>
-        </p:txBody>
-      </p:sp>
+      <p:pic>
+        <p:nvPicPr>
+          <p:cNvPr descr="../images/image-08-05.png" id="0" name="Picture 1"/>
+          <p:cNvPicPr>
+            <a:picLocks noGrp="1" noChangeAspect="1"/>
+          </p:cNvPicPr>
+          <p:nvPr/>
+        </p:nvPicPr>
+        <p:blipFill>
+          <a:blip r:embed="rId2"/>
+          <a:stretch>
+            <a:fillRect/>
+          </a:stretch>
+        </p:blipFill>
+        <p:spPr bwMode="auto">
+          <a:xfrm>
+            <a:off x="1333500" y="1600200"/>
+            <a:ext cx="6477000" cy="4521200"/>
+          </a:xfrm>
+          <a:prstGeom prst="rect">
+            <a:avLst/>
+          </a:prstGeom>
+          <a:noFill/>
+          <a:ln w="9525">
+            <a:noFill/>
+            <a:headEnd/>
+            <a:tailEnd/>
+          </a:ln>
+        </p:spPr>
+      </p:pic>
     </p:spTree>
   </p:cSld>
 </p:sld>
@@ -4295,31 +4320,36 @@
           </a:p>
         </p:txBody>
       </p:sp>
-      <p:sp>
-        <p:nvSpPr>
-          <p:cNvPr id="3" name="Content Placeholder 2"/>
-          <p:cNvSpPr>
-            <a:spLocks noGrp="1"/>
-          </p:cNvSpPr>
-          <p:nvPr>
-            <p:ph idx="1"/>
-          </p:nvPr>
-        </p:nvSpPr>
-        <p:spPr/>
-        <p:txBody>
-          <a:bodyPr/>
-          <a:lstStyle/>
-          <a:p>
-            <a:pPr lvl="0" marL="0" indent="0">
-              <a:buNone/>
-            </a:pPr>
-            <a:r>
-              <a:rPr/>
-              <a:t>(assets/img/image5.png)</a:t>
-            </a:r>
-          </a:p>
-        </p:txBody>
-      </p:sp>
+      <p:pic>
+        <p:nvPicPr>
+          <p:cNvPr descr="../images/image-08-06.png" id="0" name="Picture 1"/>
+          <p:cNvPicPr>
+            <a:picLocks noGrp="1" noChangeAspect="1"/>
+          </p:cNvPicPr>
+          <p:nvPr/>
+        </p:nvPicPr>
+        <p:blipFill>
+          <a:blip r:embed="rId2"/>
+          <a:stretch>
+            <a:fillRect/>
+          </a:stretch>
+        </p:blipFill>
+        <p:spPr bwMode="auto">
+          <a:xfrm>
+            <a:off x="1511300" y="1600200"/>
+            <a:ext cx="6108700" cy="4521200"/>
+          </a:xfrm>
+          <a:prstGeom prst="rect">
+            <a:avLst/>
+          </a:prstGeom>
+          <a:noFill/>
+          <a:ln w="9525">
+            <a:noFill/>
+            <a:headEnd/>
+            <a:tailEnd/>
+          </a:ln>
+        </p:spPr>
+      </p:pic>
     </p:spTree>
   </p:cSld>
 </p:sld>
@@ -4375,31 +4405,36 @@
           </a:p>
         </p:txBody>
       </p:sp>
-      <p:sp>
-        <p:nvSpPr>
-          <p:cNvPr id="3" name="Content Placeholder 2"/>
-          <p:cNvSpPr>
-            <a:spLocks noGrp="1"/>
-          </p:cNvSpPr>
-          <p:nvPr>
-            <p:ph idx="1"/>
-          </p:nvPr>
-        </p:nvSpPr>
-        <p:spPr/>
-        <p:txBody>
-          <a:bodyPr/>
-          <a:lstStyle/>
-          <a:p>
-            <a:pPr lvl="0" marL="0" indent="0">
-              <a:buNone/>
-            </a:pPr>
-            <a:r>
-              <a:rPr/>
-              <a:t>(assets/img/image6.emf)</a:t>
-            </a:r>
-          </a:p>
-        </p:txBody>
-      </p:sp>
+      <p:pic>
+        <p:nvPicPr>
+          <p:cNvPr descr="../images/image-08-07.png" id="0" name="Picture 1"/>
+          <p:cNvPicPr>
+            <a:picLocks noGrp="1" noChangeAspect="1"/>
+          </p:cNvPicPr>
+          <p:nvPr/>
+        </p:nvPicPr>
+        <p:blipFill>
+          <a:blip r:embed="rId2"/>
+          <a:stretch>
+            <a:fillRect/>
+          </a:stretch>
+        </p:blipFill>
+        <p:spPr bwMode="auto">
+          <a:xfrm>
+            <a:off x="939800" y="1600200"/>
+            <a:ext cx="7277100" cy="4521200"/>
+          </a:xfrm>
+          <a:prstGeom prst="rect">
+            <a:avLst/>
+          </a:prstGeom>
+          <a:noFill/>
+          <a:ln w="9525">
+            <a:noFill/>
+            <a:headEnd/>
+            <a:tailEnd/>
+          </a:ln>
+        </p:spPr>
+      </p:pic>
     </p:spTree>
   </p:cSld>
 </p:sld>
@@ -4568,31 +4603,36 @@
           </a:p>
         </p:txBody>
       </p:sp>
-      <p:sp>
-        <p:nvSpPr>
-          <p:cNvPr id="3" name="Content Placeholder 2"/>
-          <p:cNvSpPr>
-            <a:spLocks noGrp="1"/>
-          </p:cNvSpPr>
-          <p:nvPr>
-            <p:ph idx="1"/>
-          </p:nvPr>
-        </p:nvSpPr>
-        <p:spPr/>
-        <p:txBody>
-          <a:bodyPr/>
-          <a:lstStyle/>
-          <a:p>
-            <a:pPr lvl="0" marL="0" indent="0">
-              <a:buNone/>
-            </a:pPr>
-            <a:r>
-              <a:rPr/>
-              <a:t>(assets/img/image3.png)</a:t>
-            </a:r>
-          </a:p>
-        </p:txBody>
-      </p:sp>
+      <p:pic>
+        <p:nvPicPr>
+          <p:cNvPr descr="../images/image-08-08.png" id="0" name="Picture 1"/>
+          <p:cNvPicPr>
+            <a:picLocks noGrp="1" noChangeAspect="1"/>
+          </p:cNvPicPr>
+          <p:nvPr/>
+        </p:nvPicPr>
+        <p:blipFill>
+          <a:blip r:embed="rId2"/>
+          <a:stretch>
+            <a:fillRect/>
+          </a:stretch>
+        </p:blipFill>
+        <p:spPr bwMode="auto">
+          <a:xfrm>
+            <a:off x="876300" y="1600200"/>
+            <a:ext cx="7391400" cy="4521200"/>
+          </a:xfrm>
+          <a:prstGeom prst="rect">
+            <a:avLst/>
+          </a:prstGeom>
+          <a:noFill/>
+          <a:ln w="9525">
+            <a:noFill/>
+            <a:headEnd/>
+            <a:tailEnd/>
+          </a:ln>
+        </p:spPr>
+      </p:pic>
     </p:spTree>
   </p:cSld>
 </p:sld>
@@ -4763,31 +4803,36 @@
           </a:p>
         </p:txBody>
       </p:sp>
-      <p:sp>
-        <p:nvSpPr>
-          <p:cNvPr id="3" name="Content Placeholder 2"/>
-          <p:cNvSpPr>
-            <a:spLocks noGrp="1"/>
-          </p:cNvSpPr>
-          <p:nvPr>
-            <p:ph idx="1"/>
-          </p:nvPr>
-        </p:nvSpPr>
-        <p:spPr/>
-        <p:txBody>
-          <a:bodyPr/>
-          <a:lstStyle/>
-          <a:p>
-            <a:pPr lvl="0" marL="0" indent="0">
-              <a:buNone/>
-            </a:pPr>
-            <a:r>
-              <a:rPr/>
-              <a:t>(assets/img/image7.png)</a:t>
-            </a:r>
-          </a:p>
-        </p:txBody>
-      </p:sp>
+      <p:pic>
+        <p:nvPicPr>
+          <p:cNvPr descr="../images/image-08-09.png" id="0" name="Picture 1"/>
+          <p:cNvPicPr>
+            <a:picLocks noGrp="1" noChangeAspect="1"/>
+          </p:cNvPicPr>
+          <p:nvPr/>
+        </p:nvPicPr>
+        <p:blipFill>
+          <a:blip r:embed="rId2"/>
+          <a:stretch>
+            <a:fillRect/>
+          </a:stretch>
+        </p:blipFill>
+        <p:spPr bwMode="auto">
+          <a:xfrm>
+            <a:off x="2425700" y="1600200"/>
+            <a:ext cx="4305300" cy="4521200"/>
+          </a:xfrm>
+          <a:prstGeom prst="rect">
+            <a:avLst/>
+          </a:prstGeom>
+          <a:noFill/>
+          <a:ln w="9525">
+            <a:noFill/>
+            <a:headEnd/>
+            <a:tailEnd/>
+          </a:ln>
+        </p:spPr>
+      </p:pic>
     </p:spTree>
   </p:cSld>
 </p:sld>

</xml_diff>